<commit_message>
more or less final versions
</commit_message>
<xml_diff>
--- a/slice_de/04_Slice_dE.pptx
+++ b/slice_de/04_Slice_dE.pptx
@@ -1,12 +1,12 @@
 
 <file path=ppt/presentation.xml><?xml version="1.0" encoding="utf-8"?>
-<p:presentation xmlns:a="http://schemas.openxmlformats.org/drawingml/2006/main" xmlns:r="http://schemas.openxmlformats.org/officeDocument/2006/relationships" xmlns:p="http://schemas.openxmlformats.org/presentationml/2006/main" removePersonalInfoOnSave="1" saveSubsetFonts="1" autoCompressPictures="0">
+<p:presentation xmlns:a="http://schemas.openxmlformats.org/drawingml/2006/main" xmlns:r="http://schemas.openxmlformats.org/officeDocument/2006/relationships" xmlns:p="http://schemas.openxmlformats.org/presentationml/2006/main" removePersonalInfoOnSave="1" embedTrueTypeFonts="1" saveSubsetFonts="1" autoCompressPictures="0">
   <p:sldMasterIdLst>
     <p:sldMasterId id="2147483696" r:id="rId1"/>
     <p:sldMasterId id="2147483711" r:id="rId2"/>
   </p:sldMasterIdLst>
   <p:notesMasterIdLst>
-    <p:notesMasterId r:id="rId11"/>
+    <p:notesMasterId r:id="rId10"/>
   </p:notesMasterIdLst>
   <p:sldIdLst>
     <p:sldId id="297" r:id="rId3"/>
@@ -14,12 +14,36 @@
     <p:sldId id="446" r:id="rId5"/>
     <p:sldId id="447" r:id="rId6"/>
     <p:sldId id="448" r:id="rId7"/>
-    <p:sldId id="430" r:id="rId8"/>
-    <p:sldId id="442" r:id="rId9"/>
-    <p:sldId id="424" r:id="rId10"/>
+    <p:sldId id="453" r:id="rId8"/>
+    <p:sldId id="452" r:id="rId9"/>
   </p:sldIdLst>
   <p:sldSz cx="9144000" cy="6858000" type="screen4x3"/>
-  <p:notesSz cx="6858000" cy="9144000"/>
+  <p:notesSz cx="6858000" cy="9313863"/>
+  <p:embeddedFontLst>
+    <p:embeddedFont>
+      <p:font typeface="Franklin Gothic Medium" panose="020B0603020102020204" pitchFamily="34" charset="0"/>
+      <p:regular r:id="rId11"/>
+      <p:italic r:id="rId12"/>
+    </p:embeddedFont>
+    <p:embeddedFont>
+      <p:font typeface="Century Gothic" panose="020B0502020202020204" pitchFamily="34" charset="0"/>
+      <p:regular r:id="rId13"/>
+      <p:bold r:id="rId14"/>
+      <p:italic r:id="rId15"/>
+      <p:boldItalic r:id="rId16"/>
+    </p:embeddedFont>
+    <p:embeddedFont>
+      <p:font typeface="ＭＳ Ｐゴシック" panose="020B0600070205080204" pitchFamily="34" charset="-128"/>
+      <p:regular r:id="rId17"/>
+    </p:embeddedFont>
+    <p:embeddedFont>
+      <p:font typeface="Calibri" panose="020F0502020204030204" pitchFamily="34" charset="0"/>
+      <p:regular r:id="rId18"/>
+      <p:bold r:id="rId19"/>
+      <p:italic r:id="rId20"/>
+      <p:boldItalic r:id="rId21"/>
+    </p:embeddedFont>
+  </p:embeddedFontLst>
   <p:defaultTextStyle>
     <a:defPPr>
       <a:defRPr lang="en-US"/>
@@ -137,6 +161,10 @@
 </p:presentation>
 </file>
 
+<file path=ppt/revisionInfo.xml><?xml version="1.0" encoding="utf-8"?>
+<p1510:revInfo xmlns:a="http://schemas.openxmlformats.org/drawingml/2006/main" xmlns:r="http://schemas.openxmlformats.org/officeDocument/2006/relationships" xmlns:p1510="http://schemas.microsoft.com/office/powerpoint/2015/10/main"/>
+</file>
+
 <file path=ppt/notesMasters/notesMaster1.xml><?xml version="1.0" encoding="utf-8"?>
 <p:notesMaster xmlns:a="http://schemas.openxmlformats.org/drawingml/2006/main" xmlns:r="http://schemas.openxmlformats.org/officeDocument/2006/relationships" xmlns:p="http://schemas.openxmlformats.org/presentationml/2006/main">
   <p:cSld>
@@ -172,7 +200,7 @@
         <p:spPr>
           <a:xfrm>
             <a:off x="0" y="0"/>
-            <a:ext cx="2971800" cy="458788"/>
+            <a:ext cx="2971800" cy="467311"/>
           </a:xfrm>
           <a:prstGeom prst="rect">
             <a:avLst/>
@@ -203,7 +231,7 @@
         <p:spPr>
           <a:xfrm>
             <a:off x="3884613" y="0"/>
-            <a:ext cx="2971800" cy="458788"/>
+            <a:ext cx="2971800" cy="467311"/>
           </a:xfrm>
           <a:prstGeom prst="rect">
             <a:avLst/>
@@ -237,8 +265,8 @@
         </p:nvSpPr>
         <p:spPr>
           <a:xfrm>
-            <a:off x="1371600" y="1143000"/>
-            <a:ext cx="4114800" cy="3086100"/>
+            <a:off x="1333500" y="1163638"/>
+            <a:ext cx="4191000" cy="3143250"/>
           </a:xfrm>
           <a:prstGeom prst="rect">
             <a:avLst/>
@@ -270,8 +298,8 @@
         </p:nvSpPr>
         <p:spPr>
           <a:xfrm>
-            <a:off x="685800" y="4400550"/>
-            <a:ext cx="5486400" cy="3600450"/>
+            <a:off x="685800" y="4482296"/>
+            <a:ext cx="5486400" cy="3667334"/>
           </a:xfrm>
           <a:prstGeom prst="rect">
             <a:avLst/>
@@ -329,8 +357,8 @@
         </p:nvSpPr>
         <p:spPr>
           <a:xfrm>
-            <a:off x="0" y="8685213"/>
-            <a:ext cx="2971800" cy="458787"/>
+            <a:off x="0" y="8846554"/>
+            <a:ext cx="2971800" cy="467310"/>
           </a:xfrm>
           <a:prstGeom prst="rect">
             <a:avLst/>
@@ -360,8 +388,8 @@
         </p:nvSpPr>
         <p:spPr>
           <a:xfrm>
-            <a:off x="3884613" y="8685213"/>
-            <a:ext cx="2971800" cy="458787"/>
+            <a:off x="3884613" y="8846554"/>
+            <a:ext cx="2971800" cy="467310"/>
           </a:xfrm>
           <a:prstGeom prst="rect">
             <a:avLst/>
@@ -700,8 +728,8 @@
         </p:nvSpPr>
         <p:spPr bwMode="auto">
           <a:xfrm>
-            <a:off x="1143000" y="693738"/>
-            <a:ext cx="4572000" cy="3429000"/>
+            <a:off x="1101725" y="706438"/>
+            <a:ext cx="4654550" cy="3492500"/>
           </a:xfrm>
           <a:prstGeom prst="rect">
             <a:avLst/>
@@ -744,8 +772,8 @@
         </p:nvSpPr>
         <p:spPr bwMode="auto">
           <a:xfrm>
-            <a:off x="686361" y="4342535"/>
-            <a:ext cx="5485279" cy="4114511"/>
+            <a:off x="686362" y="4423204"/>
+            <a:ext cx="5485279" cy="4190944"/>
           </a:xfrm>
           <a:prstGeom prst="rect">
             <a:avLst/>
@@ -961,175 +989,7 @@
     </p:spTree>
     <p:extLst>
       <p:ext uri="{BB962C8B-B14F-4D97-AF65-F5344CB8AC3E}">
-        <p14:creationId xmlns:p14="http://schemas.microsoft.com/office/powerpoint/2010/main" val="3985799748"/>
-      </p:ext>
-    </p:extLst>
-  </p:cSld>
-  <p:clrMapOvr>
-    <a:masterClrMapping/>
-  </p:clrMapOvr>
-</p:notes>
-</file>
-
-<file path=ppt/notesSlides/notesSlide5.xml><?xml version="1.0" encoding="utf-8"?>
-<p:notes xmlns:a="http://schemas.openxmlformats.org/drawingml/2006/main" xmlns:r="http://schemas.openxmlformats.org/officeDocument/2006/relationships" xmlns:p="http://schemas.openxmlformats.org/presentationml/2006/main">
-  <p:cSld>
-    <p:spTree>
-      <p:nvGrpSpPr>
-        <p:cNvPr id="1" name=""/>
-        <p:cNvGrpSpPr/>
-        <p:nvPr/>
-      </p:nvGrpSpPr>
-      <p:grpSpPr>
-        <a:xfrm>
-          <a:off x="0" y="0"/>
-          <a:ext cx="0" cy="0"/>
-          <a:chOff x="0" y="0"/>
-          <a:chExt cx="0" cy="0"/>
-        </a:xfrm>
-      </p:grpSpPr>
-      <p:sp>
-        <p:nvSpPr>
-          <p:cNvPr id="2" name="Slide Image Placeholder 1"/>
-          <p:cNvSpPr>
-            <a:spLocks noGrp="1" noRot="1" noChangeAspect="1"/>
-          </p:cNvSpPr>
-          <p:nvPr>
-            <p:ph type="sldImg"/>
-          </p:nvPr>
-        </p:nvSpPr>
-        <p:spPr/>
-      </p:sp>
-      <p:sp>
-        <p:nvSpPr>
-          <p:cNvPr id="3" name="Notes Placeholder 2"/>
-          <p:cNvSpPr>
-            <a:spLocks noGrp="1"/>
-          </p:cNvSpPr>
-          <p:nvPr>
-            <p:ph type="body" idx="1"/>
-          </p:nvPr>
-        </p:nvSpPr>
-        <p:spPr/>
-        <p:txBody>
-          <a:bodyPr/>
-          <a:lstStyle/>
-          <a:p>
-            <a:endParaRPr lang="en-US"/>
-          </a:p>
-        </p:txBody>
-      </p:sp>
-      <p:sp>
-        <p:nvSpPr>
-          <p:cNvPr id="4" name="Slide Number Placeholder 3"/>
-          <p:cNvSpPr>
-            <a:spLocks noGrp="1"/>
-          </p:cNvSpPr>
-          <p:nvPr>
-            <p:ph type="sldNum" sz="quarter" idx="10"/>
-          </p:nvPr>
-        </p:nvSpPr>
-        <p:spPr/>
-        <p:txBody>
-          <a:bodyPr/>
-          <a:lstStyle/>
-          <a:p>
-            <a:fld id="{4E0E9D85-81CD-44C8-8F15-3AA06C34AF8C}" type="slidenum">
-              <a:rPr lang="en-US" smtClean="0"/>
-              <a:t>7</a:t>
-            </a:fld>
-            <a:endParaRPr lang="en-US"/>
-          </a:p>
-        </p:txBody>
-      </p:sp>
-    </p:spTree>
-    <p:extLst>
-      <p:ext uri="{BB962C8B-B14F-4D97-AF65-F5344CB8AC3E}">
-        <p14:creationId xmlns:p14="http://schemas.microsoft.com/office/powerpoint/2010/main" val="3283151110"/>
-      </p:ext>
-    </p:extLst>
-  </p:cSld>
-  <p:clrMapOvr>
-    <a:masterClrMapping/>
-  </p:clrMapOvr>
-</p:notes>
-</file>
-
-<file path=ppt/notesSlides/notesSlide6.xml><?xml version="1.0" encoding="utf-8"?>
-<p:notes xmlns:a="http://schemas.openxmlformats.org/drawingml/2006/main" xmlns:r="http://schemas.openxmlformats.org/officeDocument/2006/relationships" xmlns:p="http://schemas.openxmlformats.org/presentationml/2006/main">
-  <p:cSld>
-    <p:spTree>
-      <p:nvGrpSpPr>
-        <p:cNvPr id="1" name=""/>
-        <p:cNvGrpSpPr/>
-        <p:nvPr/>
-      </p:nvGrpSpPr>
-      <p:grpSpPr>
-        <a:xfrm>
-          <a:off x="0" y="0"/>
-          <a:ext cx="0" cy="0"/>
-          <a:chOff x="0" y="0"/>
-          <a:chExt cx="0" cy="0"/>
-        </a:xfrm>
-      </p:grpSpPr>
-      <p:sp>
-        <p:nvSpPr>
-          <p:cNvPr id="2" name="Slide Image Placeholder 1"/>
-          <p:cNvSpPr>
-            <a:spLocks noGrp="1" noRot="1" noChangeAspect="1"/>
-          </p:cNvSpPr>
-          <p:nvPr>
-            <p:ph type="sldImg"/>
-          </p:nvPr>
-        </p:nvSpPr>
-        <p:spPr/>
-      </p:sp>
-      <p:sp>
-        <p:nvSpPr>
-          <p:cNvPr id="3" name="Notes Placeholder 2"/>
-          <p:cNvSpPr>
-            <a:spLocks noGrp="1"/>
-          </p:cNvSpPr>
-          <p:nvPr>
-            <p:ph type="body" idx="1"/>
-          </p:nvPr>
-        </p:nvSpPr>
-        <p:spPr/>
-        <p:txBody>
-          <a:bodyPr/>
-          <a:lstStyle/>
-          <a:p>
-            <a:endParaRPr lang="en-US"/>
-          </a:p>
-        </p:txBody>
-      </p:sp>
-      <p:sp>
-        <p:nvSpPr>
-          <p:cNvPr id="4" name="Slide Number Placeholder 3"/>
-          <p:cNvSpPr>
-            <a:spLocks noGrp="1"/>
-          </p:cNvSpPr>
-          <p:nvPr>
-            <p:ph type="sldNum" sz="quarter" idx="10"/>
-          </p:nvPr>
-        </p:nvSpPr>
-        <p:spPr/>
-        <p:txBody>
-          <a:bodyPr/>
-          <a:lstStyle/>
-          <a:p>
-            <a:fld id="{4E0E9D85-81CD-44C8-8F15-3AA06C34AF8C}" type="slidenum">
-              <a:rPr lang="en-US" smtClean="0"/>
-              <a:t>8</a:t>
-            </a:fld>
-            <a:endParaRPr lang="en-US"/>
-          </a:p>
-        </p:txBody>
-      </p:sp>
-    </p:spTree>
-    <p:extLst>
-      <p:ext uri="{BB962C8B-B14F-4D97-AF65-F5344CB8AC3E}">
-        <p14:creationId xmlns:p14="http://schemas.microsoft.com/office/powerpoint/2010/main" val="3157502160"/>
+        <p14:creationId xmlns:p14="http://schemas.microsoft.com/office/powerpoint/2010/main" val="1271632639"/>
       </p:ext>
     </p:extLst>
   </p:cSld>
@@ -3953,23 +3813,16 @@
                 <a:latin typeface="Times New Roman" panose="02020603050405020304" pitchFamily="18" charset="0"/>
                 <a:cs typeface="Times New Roman" panose="02020603050405020304" pitchFamily="18" charset="0"/>
               </a:rPr>
-              <a:t> – Simulation of Beam and </a:t>
-            </a:r>
-            <a:r>
-              <a:rPr lang="en-US" sz="2800" i="1">
-                <a:latin typeface="Times New Roman" panose="02020603050405020304" pitchFamily="18" charset="0"/>
-                <a:cs typeface="Times New Roman" panose="02020603050405020304" pitchFamily="18" charset="0"/>
-              </a:rPr>
-              <a:t>Plasma Systems</a:t>
+              <a:t> – Simulation of Beam and Plasma Systems</a:t>
             </a:r>
             <a:br>
-              <a:rPr lang="en-US" sz="2800" i="1">
+              <a:rPr lang="en-US" sz="2800" i="1" dirty="0">
                 <a:latin typeface="Times New Roman" panose="02020603050405020304" pitchFamily="18" charset="0"/>
                 <a:cs typeface="Times New Roman" panose="02020603050405020304" pitchFamily="18" charset="0"/>
               </a:rPr>
             </a:br>
             <a:r>
-              <a:rPr lang="en-US" sz="1600">
+              <a:rPr lang="en-US" sz="1600" dirty="0">
                 <a:latin typeface="Times New Roman" panose="02020603050405020304" pitchFamily="18" charset="0"/>
                 <a:cs typeface="Times New Roman" panose="02020603050405020304" pitchFamily="18" charset="0"/>
               </a:rPr>
@@ -4301,7 +4154,7 @@
                 <a:ea typeface="ＭＳ Ｐゴシック"/>
                 <a:cs typeface="Times New Roman" panose="02020603050405020304" pitchFamily="18" charset="0"/>
               </a:rPr>
-              <a:t>G. Andonian, UCLA / RadiaBeam Tech</a:t>
+              <a:t>J. van Tilborg, Lawrence Berkeley Lab</a:t>
             </a:r>
           </a:p>
         </p:txBody>
@@ -4422,7 +4275,7 @@
         </p:blipFill>
         <p:spPr>
           <a:xfrm>
-            <a:off x="6293249" y="1968375"/>
+            <a:off x="6397170" y="1743866"/>
             <a:ext cx="2754553" cy="535992"/>
           </a:xfrm>
           <a:prstGeom prst="rect">
@@ -4675,12 +4528,52 @@
         </p:blipFill>
         <p:spPr>
           <a:xfrm>
-            <a:off x="6409508" y="2779620"/>
+            <a:off x="6493178" y="2279885"/>
             <a:ext cx="2159726" cy="587873"/>
           </a:xfrm>
           <a:prstGeom prst="rect">
             <a:avLst/>
           </a:prstGeom>
+        </p:spPr>
+      </p:pic>
+      <p:pic>
+        <p:nvPicPr>
+          <p:cNvPr id="12" name="Picture 9" descr="sm3">
+            <a:extLst>
+              <a:ext uri="{FF2B5EF4-FFF2-40B4-BE49-F238E27FC236}">
+                <a16:creationId xmlns:a16="http://schemas.microsoft.com/office/drawing/2014/main" id="{05ED7789-9E3D-45A7-B29C-F58565E576AD}"/>
+              </a:ext>
+            </a:extLst>
+          </p:cNvPr>
+          <p:cNvPicPr>
+            <a:picLocks noChangeAspect="1" noChangeArrowheads="1"/>
+          </p:cNvPicPr>
+          <p:nvPr/>
+        </p:nvPicPr>
+        <p:blipFill>
+          <a:blip r:embed="rId8" cstate="print">
+            <a:lum bright="2000" contrast="-4000"/>
+          </a:blip>
+          <a:srcRect l="22003" t="14001" r="23003" b="25337"/>
+          <a:stretch>
+            <a:fillRect/>
+          </a:stretch>
+        </p:blipFill>
+        <p:spPr bwMode="auto">
+          <a:xfrm>
+            <a:off x="6974927" y="2868366"/>
+            <a:ext cx="1028887" cy="680216"/>
+          </a:xfrm>
+          <a:prstGeom prst="rect">
+            <a:avLst/>
+          </a:prstGeom>
+          <a:noFill/>
+          <a:ln w="9525">
+            <a:noFill/>
+            <a:miter lim="800000"/>
+            <a:headEnd/>
+            <a:tailEnd/>
+          </a:ln>
         </p:spPr>
       </p:pic>
     </p:spTree>
@@ -4754,8 +4647,8 @@
         </p:nvSpPr>
         <p:spPr>
           <a:xfrm>
-            <a:off x="276639" y="775063"/>
-            <a:ext cx="8608944" cy="5521232"/>
+            <a:off x="276639" y="975359"/>
+            <a:ext cx="8608944" cy="5320935"/>
           </a:xfrm>
         </p:spPr>
         <p:txBody>
@@ -4766,8 +4659,35 @@
           <a:p>
             <a:r>
               <a:rPr lang="en-US" dirty="0"/>
-              <a:t>TBD</a:t>
-            </a:r>
+              <a:t>Understand slice energy spread</a:t>
+            </a:r>
+          </a:p>
+          <a:p>
+            <a:pPr lvl="1"/>
+            <a:r>
+              <a:rPr lang="en-US" dirty="0"/>
+              <a:t>why is it important for free electron lasers (FEL)</a:t>
+            </a:r>
+          </a:p>
+          <a:p>
+            <a:pPr lvl="1"/>
+            <a:r>
+              <a:rPr lang="en-US" dirty="0"/>
+              <a:t>what is the relevance to laser-plasma accelerators?</a:t>
+            </a:r>
+          </a:p>
+          <a:p>
+            <a:pPr lvl="1"/>
+            <a:endParaRPr lang="en-US" dirty="0"/>
+          </a:p>
+          <a:p>
+            <a:r>
+              <a:rPr lang="en-US" dirty="0"/>
+              <a:t>Explore a real world example, using Elegant</a:t>
+            </a:r>
+          </a:p>
+          <a:p>
+            <a:endParaRPr lang="en-US" dirty="0"/>
           </a:p>
         </p:txBody>
       </p:sp>
@@ -11392,7 +11312,7 @@
         </p:nvSpPr>
         <p:spPr>
           <a:xfrm>
-            <a:off x="0" y="140672"/>
+            <a:off x="0" y="10037"/>
             <a:ext cx="9144000" cy="589085"/>
           </a:xfrm>
         </p:spPr>
@@ -11404,20 +11324,14 @@
           <a:p>
             <a:r>
               <a:rPr lang="en-US" dirty="0"/>
-              <a:t>Class discussion:</a:t>
+              <a:t>How can one quickly stretch the longitudinal phase space?</a:t>
             </a:r>
           </a:p>
         </p:txBody>
       </p:sp>
       <p:sp>
         <p:nvSpPr>
-          <p:cNvPr id="6" name="Content Placeholder 2">
-            <a:extLst>
-              <a:ext uri="{FF2B5EF4-FFF2-40B4-BE49-F238E27FC236}">
-                <a16:creationId xmlns:a16="http://schemas.microsoft.com/office/drawing/2014/main" id="{9081FF26-7AD5-4767-AF65-A27F1769E1FC}"/>
-              </a:ext>
-            </a:extLst>
-          </p:cNvPr>
+          <p:cNvPr id="3" name="Content Placeholder 2"/>
           <p:cNvSpPr>
             <a:spLocks noGrp="1"/>
           </p:cNvSpPr>
@@ -11427,8 +11341,8 @@
         </p:nvSpPr>
         <p:spPr>
           <a:xfrm>
-            <a:off x="322216" y="827314"/>
-            <a:ext cx="8669383" cy="5364480"/>
+            <a:off x="276639" y="975359"/>
+            <a:ext cx="8608944" cy="5320935"/>
           </a:xfrm>
         </p:spPr>
         <p:txBody>
@@ -11438,24 +11352,42 @@
           <a:lstStyle/>
           <a:p>
             <a:r>
-              <a:rPr lang="en-US" sz="1800" i="0" dirty="0"/>
-              <a:t>Any questions at this point?</a:t>
+              <a:rPr lang="en-US" dirty="0"/>
+              <a:t>Use a chicane (a sequence of dipoles)</a:t>
             </a:r>
           </a:p>
           <a:p>
             <a:pPr lvl="1"/>
-            <a:endParaRPr lang="en-US" i="0" dirty="0"/>
-          </a:p>
-          <a:p>
             <a:r>
               <a:rPr lang="en-US" dirty="0"/>
-              <a:t>Have</a:t>
-            </a:r>
-          </a:p>
-          <a:p>
-            <a:pPr marL="0" indent="0">
-              <a:buNone/>
-            </a:pPr>
+              <a:t>typically used to compress bunches</a:t>
+            </a:r>
+          </a:p>
+          <a:p>
+            <a:pPr lvl="1"/>
+            <a:r>
+              <a:rPr lang="en-US" dirty="0"/>
+              <a:t>here, it is being used to longitudinally stretch the bunch</a:t>
+            </a:r>
+          </a:p>
+          <a:p>
+            <a:pPr lvl="1"/>
+            <a:endParaRPr lang="en-US" dirty="0"/>
+          </a:p>
+          <a:p>
+            <a:r>
+              <a:rPr lang="en-US" dirty="0"/>
+              <a:t>Explore a real world example</a:t>
+            </a:r>
+          </a:p>
+          <a:p>
+            <a:pPr lvl="1"/>
+            <a:r>
+              <a:rPr lang="en-US" dirty="0"/>
+              <a:t>from the ATF (Accelerator Test Facility) at Brookhaven National Lab</a:t>
+            </a:r>
+          </a:p>
+          <a:p>
             <a:endParaRPr lang="en-US" dirty="0"/>
           </a:p>
         </p:txBody>
@@ -11463,7 +11395,7 @@
     </p:spTree>
     <p:extLst>
       <p:ext uri="{BB962C8B-B14F-4D97-AF65-F5344CB8AC3E}">
-        <p14:creationId xmlns:p14="http://schemas.microsoft.com/office/powerpoint/2010/main" val="2070114419"/>
+        <p14:creationId xmlns:p14="http://schemas.microsoft.com/office/powerpoint/2010/main" val="2323513567"/>
       </p:ext>
     </p:extLst>
   </p:cSld>
@@ -11500,117 +11432,225 @@
             <p:ph type="title"/>
           </p:nvPr>
         </p:nvSpPr>
-        <p:spPr>
-          <a:xfrm>
-            <a:off x="0" y="10037"/>
-            <a:ext cx="5782491" cy="589085"/>
-          </a:xfrm>
-        </p:spPr>
+        <p:spPr/>
         <p:txBody>
-          <a:bodyPr>
-            <a:normAutofit/>
-          </a:bodyPr>
+          <a:bodyPr/>
           <a:lstStyle/>
           <a:p>
             <a:r>
               <a:rPr lang="en-US" dirty="0"/>
-              <a:t>The accelerator design workflow</a:t>
+              <a:t>User case: Chicane for LPA-FEL</a:t>
             </a:r>
           </a:p>
         </p:txBody>
       </p:sp>
       <p:pic>
         <p:nvPicPr>
-          <p:cNvPr id="4" name="Picture 3">
-            <a:extLst>
-              <a:ext uri="{FF2B5EF4-FFF2-40B4-BE49-F238E27FC236}">
-                <a16:creationId xmlns:a16="http://schemas.microsoft.com/office/drawing/2014/main" id="{17AFD9B6-06E6-4AA5-9B1E-1D0D1DB40754}"/>
-              </a:ext>
-            </a:extLst>
-          </p:cNvPr>
+          <p:cNvPr id="4" name="Picture 3"/>
           <p:cNvPicPr>
             <a:picLocks noChangeAspect="1"/>
           </p:cNvPicPr>
           <p:nvPr/>
         </p:nvPicPr>
         <p:blipFill>
-          <a:blip r:embed="rId3"/>
+          <a:blip r:embed="rId2"/>
           <a:stretch>
             <a:fillRect/>
           </a:stretch>
         </p:blipFill>
         <p:spPr>
           <a:xfrm>
-            <a:off x="1802673" y="639633"/>
-            <a:ext cx="7350437" cy="2188339"/>
+            <a:off x="344440" y="3711179"/>
+            <a:ext cx="7414950" cy="2153571"/>
           </a:xfrm>
           <a:prstGeom prst="rect">
             <a:avLst/>
           </a:prstGeom>
         </p:spPr>
       </p:pic>
-    </p:spTree>
-    <p:extLst>
-      <p:ext uri="{BB962C8B-B14F-4D97-AF65-F5344CB8AC3E}">
-        <p14:creationId xmlns:p14="http://schemas.microsoft.com/office/powerpoint/2010/main" val="3075658079"/>
-      </p:ext>
-    </p:extLst>
-  </p:cSld>
-  <p:clrMapOvr>
-    <a:masterClrMapping/>
-  </p:clrMapOvr>
-</p:sld>
-</file>
-
-<file path=ppt/slides/slide8.xml><?xml version="1.0" encoding="utf-8"?>
-<p:sld xmlns:a="http://schemas.openxmlformats.org/drawingml/2006/main" xmlns:r="http://schemas.openxmlformats.org/officeDocument/2006/relationships" xmlns:p="http://schemas.openxmlformats.org/presentationml/2006/main">
-  <p:cSld>
-    <p:spTree>
-      <p:nvGrpSpPr>
-        <p:cNvPr id="1" name=""/>
-        <p:cNvGrpSpPr/>
-        <p:nvPr/>
-      </p:nvGrpSpPr>
-      <p:grpSpPr>
-        <a:xfrm>
-          <a:off x="0" y="0"/>
-          <a:ext cx="0" cy="0"/>
-          <a:chOff x="0" y="0"/>
-          <a:chExt cx="0" cy="0"/>
-        </a:xfrm>
-      </p:grpSpPr>
+      <p:pic>
+        <p:nvPicPr>
+          <p:cNvPr id="5" name="Picture 4" descr="Screen Shot 2017-10-27 at 12.04.33 AM.png"/>
+          <p:cNvPicPr>
+            <a:picLocks noChangeAspect="1"/>
+          </p:cNvPicPr>
+          <p:nvPr/>
+        </p:nvPicPr>
+        <p:blipFill>
+          <a:blip r:embed="rId3">
+            <a:extLst>
+              <a:ext uri="{28A0092B-C50C-407E-A947-70E740481C1C}">
+                <a14:useLocalDpi xmlns:a14="http://schemas.microsoft.com/office/drawing/2010/main" val="0"/>
+              </a:ext>
+            </a:extLst>
+          </a:blip>
+          <a:stretch>
+            <a:fillRect/>
+          </a:stretch>
+        </p:blipFill>
+        <p:spPr>
+          <a:xfrm>
+            <a:off x="4869756" y="756076"/>
+            <a:ext cx="3934592" cy="1977108"/>
+          </a:xfrm>
+          <a:prstGeom prst="rect">
+            <a:avLst/>
+          </a:prstGeom>
+        </p:spPr>
+      </p:pic>
       <p:sp>
         <p:nvSpPr>
-          <p:cNvPr id="2" name="Title 1"/>
-          <p:cNvSpPr>
-            <a:spLocks noGrp="1"/>
-          </p:cNvSpPr>
-          <p:nvPr>
-            <p:ph type="title"/>
-          </p:nvPr>
+          <p:cNvPr id="6" name="TextBox 5"/>
+          <p:cNvSpPr txBox="1"/>
+          <p:nvPr/>
         </p:nvSpPr>
         <p:spPr>
           <a:xfrm>
-            <a:off x="0" y="70385"/>
-            <a:ext cx="9144000" cy="589085"/>
-          </a:xfrm>
+            <a:off x="4953991" y="2657489"/>
+            <a:ext cx="3403496" cy="369332"/>
+          </a:xfrm>
+          <a:prstGeom prst="rect">
+            <a:avLst/>
+          </a:prstGeom>
+          <a:noFill/>
         </p:spPr>
         <p:txBody>
-          <a:bodyPr>
-            <a:normAutofit/>
+          <a:bodyPr wrap="none" rtlCol="0">
+            <a:spAutoFit/>
           </a:bodyPr>
           <a:lstStyle/>
           <a:p>
             <a:r>
               <a:rPr lang="en-US" dirty="0"/>
-              <a:t>Wrap up</a:t>
+              <a:t>Modeled with </a:t>
+            </a:r>
+            <a:r>
+              <a:rPr lang="en-US" dirty="0" err="1"/>
+              <a:t>sirepo.elegant</a:t>
+            </a:r>
+            <a:endParaRPr lang="en-US" dirty="0"/>
+          </a:p>
+        </p:txBody>
+      </p:sp>
+      <p:cxnSp>
+        <p:nvCxnSpPr>
+          <p:cNvPr id="8" name="Straight Arrow Connector 7"/>
+          <p:cNvCxnSpPr/>
+          <p:nvPr/>
+        </p:nvCxnSpPr>
+        <p:spPr>
+          <a:xfrm flipH="1">
+            <a:off x="3729389" y="2103704"/>
+            <a:ext cx="1311687" cy="1710450"/>
+          </a:xfrm>
+          <a:prstGeom prst="straightConnector1">
+            <a:avLst/>
+          </a:prstGeom>
+          <a:ln>
+            <a:tailEnd type="arrow"/>
+          </a:ln>
+        </p:spPr>
+        <p:style>
+          <a:lnRef idx="2">
+            <a:schemeClr val="accent1"/>
+          </a:lnRef>
+          <a:fillRef idx="0">
+            <a:schemeClr val="accent1"/>
+          </a:fillRef>
+          <a:effectRef idx="1">
+            <a:schemeClr val="accent1"/>
+          </a:effectRef>
+          <a:fontRef idx="minor">
+            <a:schemeClr val="tx1"/>
+          </a:fontRef>
+        </p:style>
+      </p:cxnSp>
+      <p:cxnSp>
+        <p:nvCxnSpPr>
+          <p:cNvPr id="10" name="Straight Arrow Connector 9"/>
+          <p:cNvCxnSpPr/>
+          <p:nvPr/>
+        </p:nvCxnSpPr>
+        <p:spPr>
+          <a:xfrm flipH="1">
+            <a:off x="5699115" y="1922292"/>
+            <a:ext cx="427638" cy="1891862"/>
+          </a:xfrm>
+          <a:prstGeom prst="straightConnector1">
+            <a:avLst/>
+          </a:prstGeom>
+          <a:ln>
+            <a:tailEnd type="arrow"/>
+          </a:ln>
+        </p:spPr>
+        <p:style>
+          <a:lnRef idx="2">
+            <a:schemeClr val="accent1"/>
+          </a:lnRef>
+          <a:fillRef idx="0">
+            <a:schemeClr val="accent1"/>
+          </a:fillRef>
+          <a:effectRef idx="1">
+            <a:schemeClr val="accent1"/>
+          </a:effectRef>
+          <a:fontRef idx="minor">
+            <a:schemeClr val="tx1"/>
+          </a:fontRef>
+        </p:style>
+      </p:cxnSp>
+      <p:sp>
+        <p:nvSpPr>
+          <p:cNvPr id="13" name="TextBox 12"/>
+          <p:cNvSpPr txBox="1"/>
+          <p:nvPr/>
+        </p:nvSpPr>
+        <p:spPr>
+          <a:xfrm>
+            <a:off x="5771096" y="5948948"/>
+            <a:ext cx="3006637" cy="369332"/>
+          </a:xfrm>
+          <a:prstGeom prst="rect">
+            <a:avLst/>
+          </a:prstGeom>
+        </p:spPr>
+        <p:style>
+          <a:lnRef idx="2">
+            <a:schemeClr val="accent6">
+              <a:shade val="50000"/>
+            </a:schemeClr>
+          </a:lnRef>
+          <a:fillRef idx="1">
+            <a:schemeClr val="accent6"/>
+          </a:fillRef>
+          <a:effectRef idx="0">
+            <a:schemeClr val="accent6"/>
+          </a:effectRef>
+          <a:fontRef idx="minor">
+            <a:schemeClr val="lt1"/>
+          </a:fontRef>
+        </p:style>
+        <p:txBody>
+          <a:bodyPr wrap="none" rtlCol="0">
+            <a:spAutoFit/>
+          </a:bodyPr>
+          <a:lstStyle/>
+          <a:p>
+            <a:r>
+              <a:rPr lang="en-US" i="1" dirty="0"/>
+              <a:t>Courtesy S. Barber (LBNL)</a:t>
             </a:r>
           </a:p>
         </p:txBody>
       </p:sp>
       <p:sp>
         <p:nvSpPr>
-          <p:cNvPr id="3" name="Content Placeholder 2"/>
+          <p:cNvPr id="12" name="Content Placeholder 2">
+            <a:extLst>
+              <a:ext uri="{FF2B5EF4-FFF2-40B4-BE49-F238E27FC236}">
+                <a16:creationId xmlns:a16="http://schemas.microsoft.com/office/drawing/2014/main" id="{34472005-102D-4662-BF98-BE35DE3145F5}"/>
+              </a:ext>
+            </a:extLst>
+          </p:cNvPr>
           <p:cNvSpPr>
             <a:spLocks noGrp="1"/>
           </p:cNvSpPr>
@@ -11620,8 +11660,8 @@
         </p:nvSpPr>
         <p:spPr>
           <a:xfrm>
-            <a:off x="152400" y="862150"/>
-            <a:ext cx="8839200" cy="5441932"/>
+            <a:off x="204962" y="701647"/>
+            <a:ext cx="4305018" cy="3058078"/>
           </a:xfrm>
         </p:spPr>
         <p:txBody>
@@ -11632,24 +11672,52 @@
           <a:p>
             <a:r>
               <a:rPr lang="en-US" dirty="0"/>
-              <a:t>Any final questions regarding the material in this lecture?</a:t>
+              <a:t>LPA source brightness is good for FEL, slice energy spread is not</a:t>
+            </a:r>
+          </a:p>
+          <a:p>
+            <a:r>
+              <a:rPr lang="en-US" dirty="0"/>
+              <a:t>Use chicane to </a:t>
+            </a:r>
+            <a:r>
+              <a:rPr lang="en-US" i="1" dirty="0"/>
+              <a:t>stretch</a:t>
+            </a:r>
+            <a:r>
+              <a:rPr lang="en-US" dirty="0"/>
+              <a:t> beam, reduce slice energy spread</a:t>
+            </a:r>
+          </a:p>
+          <a:p>
+            <a:r>
+              <a:rPr lang="en-US" dirty="0"/>
+              <a:t>Find balance between reduction in beam current and slice energy spread</a:t>
+            </a:r>
+          </a:p>
+          <a:p>
+            <a:r>
+              <a:rPr lang="en-US" dirty="0"/>
+              <a:t>Optimal R</a:t>
+            </a:r>
+            <a:r>
+              <a:rPr lang="en-US" baseline="-25000" dirty="0"/>
+              <a:t>56</a:t>
+            </a:r>
+            <a:r>
+              <a:rPr lang="en-US" dirty="0"/>
+              <a:t> depends on initial beam parameters</a:t>
             </a:r>
           </a:p>
           <a:p>
             <a:endParaRPr lang="en-US" dirty="0"/>
-          </a:p>
-          <a:p>
-            <a:r>
-              <a:rPr lang="en-US" dirty="0"/>
-              <a:t>Have</a:t>
-            </a:r>
           </a:p>
         </p:txBody>
       </p:sp>
     </p:spTree>
     <p:extLst>
       <p:ext uri="{BB962C8B-B14F-4D97-AF65-F5344CB8AC3E}">
-        <p14:creationId xmlns:p14="http://schemas.microsoft.com/office/powerpoint/2010/main" val="12542219"/>
+        <p14:creationId xmlns:p14="http://schemas.microsoft.com/office/powerpoint/2010/main" val="2106978325"/>
       </p:ext>
     </p:extLst>
   </p:cSld>

</xml_diff>